<commit_message>
Updated week 2 material.
</commit_message>
<xml_diff>
--- a/teaching/f15_cpsc217/Week_2_1.pptx
+++ b/teaching/f15_cpsc217/Week_2_1.pptx
@@ -4596,11 +4596,7 @@
             </a:br>
             <a:r>
               <a:rPr lang="en-US" dirty="0" smtClean="0"/>
-              <a:t>Week </a:t>
-            </a:r>
-            <a:r>
-              <a:rPr lang="en-US" dirty="0" smtClean="0"/>
-              <a:t>II</a:t>
+              <a:t>Week II</a:t>
             </a:r>
             <a:endParaRPr lang="en-US" dirty="0"/>
           </a:p>
@@ -4633,11 +4629,7 @@
             </a:pPr>
             <a:r>
               <a:rPr lang="en-US" b="1" dirty="0" smtClean="0"/>
-              <a:t>Part </a:t>
-            </a:r>
-            <a:r>
-              <a:rPr lang="en-US" b="1" dirty="0" smtClean="0"/>
-              <a:t>#1: SimpleGraphics.py</a:t>
+              <a:t>Part #1: SimpleGraphics.py</a:t>
             </a:r>
           </a:p>
           <a:p>
@@ -4648,11 +4640,7 @@
             </a:pPr>
             <a:r>
               <a:rPr lang="en-US" b="1" dirty="0" smtClean="0"/>
-              <a:t>Hubert </a:t>
-            </a:r>
-            <a:r>
-              <a:rPr lang="en-US" b="1" dirty="0" smtClean="0"/>
-              <a:t>(</a:t>
+              <a:t>Hubert (</a:t>
             </a:r>
             <a:r>
               <a:rPr lang="en-US" b="1" dirty="0" err="1" smtClean="0"/>
@@ -5746,7 +5734,7 @@
           <a:p>
             <a:r>
               <a:rPr lang="en-US" dirty="0" smtClean="0"/>
-              <a:t>Exercise</a:t>
+              <a:t>One Last Thing</a:t>
             </a:r>
             <a:endParaRPr lang="en-US" dirty="0"/>
           </a:p>
@@ -5769,7 +5757,22 @@
           <a:p>
             <a:r>
               <a:rPr lang="en-US" dirty="0" smtClean="0"/>
-              <a:t>Your task is now to complete Exercise #2. You can also use Wednesday to complete it as well.</a:t>
+              <a:t>The remainder of the class is to be used for completing Assignment #1 and Exercise #2.</a:t>
+            </a:r>
+          </a:p>
+          <a:p>
+            <a:endParaRPr lang="en-US" dirty="0"/>
+          </a:p>
+          <a:p>
+            <a:r>
+              <a:rPr lang="en-US" dirty="0" smtClean="0"/>
+              <a:t>However, before that, you should also think about the first part of Assignment #1. It asks you to receive the user’s input and then uses the input to set an object’s position.</a:t>
+            </a:r>
+          </a:p>
+          <a:p>
+            <a:r>
+              <a:rPr lang="en-US" dirty="0" smtClean="0"/>
+              <a:t>If you don’t know how to do this, please don’t hesitate to ask me.</a:t>
             </a:r>
             <a:endParaRPr lang="en-US" dirty="0"/>
           </a:p>
@@ -6072,7 +6075,6 @@
               <a:rPr lang="en-US" dirty="0" smtClean="0"/>
               <a:t>Texting</a:t>
             </a:r>
-            <a:endParaRPr lang="en-US" dirty="0" smtClean="0"/>
           </a:p>
           <a:p>
             <a:pPr lvl="1"/>
@@ -6080,7 +6082,6 @@
               <a:rPr lang="en-US" dirty="0" smtClean="0"/>
               <a:t>Setting outline</a:t>
             </a:r>
-            <a:endParaRPr lang="en-US" dirty="0" smtClean="0"/>
           </a:p>
           <a:p>
             <a:pPr lvl="1"/>
@@ -6090,12 +6091,13 @@
             </a:r>
             <a:r>
               <a:rPr lang="en-US" dirty="0" smtClean="0"/>
-              <a:t> stuffs</a:t>
-            </a:r>
-          </a:p>
-          <a:p>
-            <a:pPr lvl="1"/>
-            <a:endParaRPr lang="en-US" dirty="0" smtClean="0"/>
+              <a:t> </a:t>
+            </a:r>
+            <a:r>
+              <a:rPr lang="en-US" dirty="0" smtClean="0"/>
+              <a:t>stuffs</a:t>
+            </a:r>
+            <a:endParaRPr lang="en-US" dirty="0"/>
           </a:p>
         </p:txBody>
       </p:sp>
@@ -6220,7 +6222,22 @@
             </a:pPr>
             <a:r>
               <a:rPr lang="en-US" dirty="0" smtClean="0"/>
-              <a:t>Want to experiment something in Python? Simply call python3 without any file. You will be greeted with an interactive shell.</a:t>
+              <a:t>Want to experiment something in Python? Simply call python3 without any file. You will be greeted with an interactive shell</a:t>
+            </a:r>
+            <a:r>
+              <a:rPr lang="en-US" dirty="0" smtClean="0"/>
+              <a:t>.</a:t>
+            </a:r>
+          </a:p>
+          <a:p>
+            <a:pPr marL="857250" lvl="1" indent="-457200"/>
+            <a:r>
+              <a:rPr lang="en-US" i="0" dirty="0" smtClean="0"/>
+              <a:t>Unfortunately, the interactive shell doesn’t work with </a:t>
+            </a:r>
+            <a:r>
+              <a:rPr lang="en-US" i="0" smtClean="0"/>
+              <a:t>SimpleGraphics.py though…</a:t>
             </a:r>
             <a:endParaRPr lang="en-US" i="0" dirty="0"/>
           </a:p>

</xml_diff>